<commit_message>
visualize the decision, so happy!
</commit_message>
<xml_diff>
--- a/GroupHomework/Record.pptx
+++ b/GroupHomework/Record.pptx
@@ -16,6 +16,8 @@
     <p:sldId id="262" r:id="rId10"/>
     <p:sldId id="269" r:id="rId11"/>
     <p:sldId id="268" r:id="rId12"/>
+    <p:sldId id="270" r:id="rId13"/>
+    <p:sldId id="271" r:id="rId14"/>
   </p:sldIdLst>
   <p:sldSz cx="12192000" cy="6858000"/>
   <p:notesSz cx="6858000" cy="9144000"/>
@@ -269,7 +271,7 @@
           <a:p>
             <a:fld id="{C1A1EA91-298B-4DC2-BA8A-339FF847713D}" type="datetimeFigureOut">
               <a:rPr lang="zh-CN" altLang="en-US" smtClean="0"/>
-              <a:t>2019/11/9</a:t>
+              <a:t>2019/11/11</a:t>
             </a:fld>
             <a:endParaRPr lang="zh-CN" altLang="en-US"/>
           </a:p>
@@ -467,7 +469,7 @@
           <a:p>
             <a:fld id="{C1A1EA91-298B-4DC2-BA8A-339FF847713D}" type="datetimeFigureOut">
               <a:rPr lang="zh-CN" altLang="en-US" smtClean="0"/>
-              <a:t>2019/11/9</a:t>
+              <a:t>2019/11/11</a:t>
             </a:fld>
             <a:endParaRPr lang="zh-CN" altLang="en-US"/>
           </a:p>
@@ -675,7 +677,7 @@
           <a:p>
             <a:fld id="{C1A1EA91-298B-4DC2-BA8A-339FF847713D}" type="datetimeFigureOut">
               <a:rPr lang="zh-CN" altLang="en-US" smtClean="0"/>
-              <a:t>2019/11/9</a:t>
+              <a:t>2019/11/11</a:t>
             </a:fld>
             <a:endParaRPr lang="zh-CN" altLang="en-US"/>
           </a:p>
@@ -873,7 +875,7 @@
           <a:p>
             <a:fld id="{C1A1EA91-298B-4DC2-BA8A-339FF847713D}" type="datetimeFigureOut">
               <a:rPr lang="zh-CN" altLang="en-US" smtClean="0"/>
-              <a:t>2019/11/9</a:t>
+              <a:t>2019/11/11</a:t>
             </a:fld>
             <a:endParaRPr lang="zh-CN" altLang="en-US"/>
           </a:p>
@@ -1148,7 +1150,7 @@
           <a:p>
             <a:fld id="{C1A1EA91-298B-4DC2-BA8A-339FF847713D}" type="datetimeFigureOut">
               <a:rPr lang="zh-CN" altLang="en-US" smtClean="0"/>
-              <a:t>2019/11/9</a:t>
+              <a:t>2019/11/11</a:t>
             </a:fld>
             <a:endParaRPr lang="zh-CN" altLang="en-US"/>
           </a:p>
@@ -1413,7 +1415,7 @@
           <a:p>
             <a:fld id="{C1A1EA91-298B-4DC2-BA8A-339FF847713D}" type="datetimeFigureOut">
               <a:rPr lang="zh-CN" altLang="en-US" smtClean="0"/>
-              <a:t>2019/11/9</a:t>
+              <a:t>2019/11/11</a:t>
             </a:fld>
             <a:endParaRPr lang="zh-CN" altLang="en-US"/>
           </a:p>
@@ -1825,7 +1827,7 @@
           <a:p>
             <a:fld id="{C1A1EA91-298B-4DC2-BA8A-339FF847713D}" type="datetimeFigureOut">
               <a:rPr lang="zh-CN" altLang="en-US" smtClean="0"/>
-              <a:t>2019/11/9</a:t>
+              <a:t>2019/11/11</a:t>
             </a:fld>
             <a:endParaRPr lang="zh-CN" altLang="en-US"/>
           </a:p>
@@ -1966,7 +1968,7 @@
           <a:p>
             <a:fld id="{C1A1EA91-298B-4DC2-BA8A-339FF847713D}" type="datetimeFigureOut">
               <a:rPr lang="zh-CN" altLang="en-US" smtClean="0"/>
-              <a:t>2019/11/9</a:t>
+              <a:t>2019/11/11</a:t>
             </a:fld>
             <a:endParaRPr lang="zh-CN" altLang="en-US"/>
           </a:p>
@@ -2079,7 +2081,7 @@
           <a:p>
             <a:fld id="{C1A1EA91-298B-4DC2-BA8A-339FF847713D}" type="datetimeFigureOut">
               <a:rPr lang="zh-CN" altLang="en-US" smtClean="0"/>
-              <a:t>2019/11/9</a:t>
+              <a:t>2019/11/11</a:t>
             </a:fld>
             <a:endParaRPr lang="zh-CN" altLang="en-US"/>
           </a:p>
@@ -2390,7 +2392,7 @@
           <a:p>
             <a:fld id="{C1A1EA91-298B-4DC2-BA8A-339FF847713D}" type="datetimeFigureOut">
               <a:rPr lang="zh-CN" altLang="en-US" smtClean="0"/>
-              <a:t>2019/11/9</a:t>
+              <a:t>2019/11/11</a:t>
             </a:fld>
             <a:endParaRPr lang="zh-CN" altLang="en-US"/>
           </a:p>
@@ -2678,7 +2680,7 @@
           <a:p>
             <a:fld id="{C1A1EA91-298B-4DC2-BA8A-339FF847713D}" type="datetimeFigureOut">
               <a:rPr lang="zh-CN" altLang="en-US" smtClean="0"/>
-              <a:t>2019/11/9</a:t>
+              <a:t>2019/11/11</a:t>
             </a:fld>
             <a:endParaRPr lang="zh-CN" altLang="en-US"/>
           </a:p>
@@ -2919,7 +2921,7 @@
           <a:p>
             <a:fld id="{C1A1EA91-298B-4DC2-BA8A-339FF847713D}" type="datetimeFigureOut">
               <a:rPr lang="zh-CN" altLang="en-US" smtClean="0"/>
-              <a:t>2019/11/9</a:t>
+              <a:t>2019/11/11</a:t>
             </a:fld>
             <a:endParaRPr lang="zh-CN" altLang="en-US"/>
           </a:p>
@@ -4358,6 +4360,197 @@
     <p:extLst>
       <p:ext uri="{BB962C8B-B14F-4D97-AF65-F5344CB8AC3E}">
         <p14:creationId xmlns:p14="http://schemas.microsoft.com/office/powerpoint/2010/main" val="3750202611"/>
+      </p:ext>
+    </p:extLst>
+  </p:cSld>
+  <p:clrMapOvr>
+    <a:masterClrMapping/>
+  </p:clrMapOvr>
+</p:sld>
+</file>
+
+<file path=ppt/slides/slide12.xml><?xml version="1.0" encoding="utf-8"?>
+<p:sld xmlns:a="http://schemas.openxmlformats.org/drawingml/2006/main" xmlns:r="http://schemas.openxmlformats.org/officeDocument/2006/relationships" xmlns:p="http://schemas.openxmlformats.org/presentationml/2006/main">
+  <p:cSld>
+    <p:spTree>
+      <p:nvGrpSpPr>
+        <p:cNvPr id="1" name=""/>
+        <p:cNvGrpSpPr/>
+        <p:nvPr/>
+      </p:nvGrpSpPr>
+      <p:grpSpPr>
+        <a:xfrm>
+          <a:off x="0" y="0"/>
+          <a:ext cx="0" cy="0"/>
+          <a:chOff x="0" y="0"/>
+          <a:chExt cx="0" cy="0"/>
+        </a:xfrm>
+      </p:grpSpPr>
+      <p:sp>
+        <p:nvSpPr>
+          <p:cNvPr id="2" name="标题 1">
+            <a:extLst>
+              <a:ext uri="{FF2B5EF4-FFF2-40B4-BE49-F238E27FC236}">
+                <a16:creationId xmlns:a16="http://schemas.microsoft.com/office/drawing/2014/main" id="{6E6BBE08-79B4-4F7A-A6D5-E9D3A5DA7BF0}"/>
+              </a:ext>
+            </a:extLst>
+          </p:cNvPr>
+          <p:cNvSpPr>
+            <a:spLocks noGrp="1"/>
+          </p:cNvSpPr>
+          <p:nvPr>
+            <p:ph type="title"/>
+          </p:nvPr>
+        </p:nvSpPr>
+        <p:spPr/>
+        <p:txBody>
+          <a:bodyPr/>
+          <a:lstStyle/>
+          <a:p>
+            <a:r>
+              <a:rPr lang="en-US" altLang="zh-CN" dirty="0"/>
+              <a:t>Document clustering </a:t>
+            </a:r>
+            <a:r>
+              <a:rPr lang="zh-CN" altLang="en-US" dirty="0"/>
+              <a:t>根据 </a:t>
+            </a:r>
+            <a:r>
+              <a:rPr lang="en-US" altLang="zh-CN" dirty="0"/>
+              <a:t>KL</a:t>
+            </a:r>
+            <a:r>
+              <a:rPr lang="zh-CN" altLang="en-US" dirty="0"/>
+              <a:t>散度得到的结果</a:t>
+            </a:r>
+          </a:p>
+        </p:txBody>
+      </p:sp>
+      <p:sp>
+        <p:nvSpPr>
+          <p:cNvPr id="3" name="内容占位符 2">
+            <a:extLst>
+              <a:ext uri="{FF2B5EF4-FFF2-40B4-BE49-F238E27FC236}">
+                <a16:creationId xmlns:a16="http://schemas.microsoft.com/office/drawing/2014/main" id="{B8852828-546C-4F88-A7A5-B7DAFA0A673C}"/>
+              </a:ext>
+            </a:extLst>
+          </p:cNvPr>
+          <p:cNvSpPr>
+            <a:spLocks noGrp="1"/>
+          </p:cNvSpPr>
+          <p:nvPr>
+            <p:ph idx="1"/>
+          </p:nvPr>
+        </p:nvSpPr>
+        <p:spPr/>
+        <p:txBody>
+          <a:bodyPr>
+            <a:normAutofit fontScale="92500" lnSpcReduction="20000"/>
+          </a:bodyPr>
+          <a:lstStyle/>
+          <a:p>
+            <a:r>
+              <a:rPr lang="en-US" altLang="zh-CN" dirty="0"/>
+              <a:t>[4, 4, 2, 3, 4, 4, 0, 4, 3, 4, 0, 4, 4, 3, 0, 0, 1, 4, 4, 4, 1, 0, 3, 4, 0, 3, 1, 0, 3, 3, 2, 0, 4, 4, 0, 1, 4, 1, 4, 3, 4, 1, 3, 4, 2, 4, 4, 4, 4, 0, 3, 4, 4, 4, 4, 3, 0, 0, 1, 4, 2, 4, 3, 1, 3, 0, 1, 2, 3, 4, 2, 3, 4, 4, 3, 4, 0, 0, 3, 3, 0, 3, 4, 4, 3, 3, 4, 0, 4, 4, 4, 3, 0, 0, 4, 0, 4, 1, 3, 3, 1, 3, 3, 3, 0, 0, 3, 0, 4, 0, 3, 0, 4, 1, 0, 0, 4, 3, 4, 4, 3, 4, 4, 0, 1, 4, 4, 0, 4, 0, 4, 0, 4, 4, 1, 1, 3, 4, 0, 4, 1, 4, 4, 3, 4, 3, 3, 4, 0, 4, 4, 4, 3, 0, 4, 0, 3, 0, 4, 1, 4, 2, 3, 4, 0, 3, 3, 4, 0, 0, 1, 3, 0, 0, 1, 4, 3, 0, 3, 3, 0, 2, 4, 4, 3, 0, 4, 3, 0, 3, 0, 2, 0, 4, 4, 0, 0, 1, 0, 4, 0, 0, 4, 4, 4, 3, 0, 4, 4, 1, 4, 4, 0, 0, 1, 1, 3, 4, 1, 4, 0, 4, 4, 3, 2, 4, 1, 3, 4, 4, 0, 1, 4, 3, 3, 4, 3, 0, 4, 0, 4, 1, 4, 4, 3, 0, 3, 0, 4, 4, 0, 4, 1, 4, 4, 3, 3, 4, 4, 4, 4, 2, 3, 4, 4, 1, 0, 4, 3, 3, 2, 4, 0, 4, 3, 3, 4, 3, 4, 1, 4, 0, 4, 0, 0, 4, 3, 3, 4, 0, 4, 0, 0, 4, 0, 2, 3, 4, 4, 4, 3, 1, 4, 2, 0, 4, 3, 2, 1, 4, 4, 3, 0, 3, 0, 0, 4, 3, 4, 0, 1, 3, 4, 0, 1, 4, 0, 4, 4, 4, 3, 4, 4, 0, 0, 4, 2, 3, 0, 4, 0, 4, 3, 2, 4, 0, 0, 1, 4, 4, 4, 4, 0, 4, 0, 4, 0, 3, 0, 2, 4, 1, 4, 4, 4, 4, 2, 1, 4, 0, 0, 3, 4, 1, 0, 0, 4, 0, 4, 3, 1, 1, 4, 0, 3, 4, 0, 0, 4, 0, 0, 0, 4, 3, 4, 0, 1, 4]</a:t>
+            </a:r>
+            <a:endParaRPr lang="zh-CN" altLang="en-US" dirty="0"/>
+          </a:p>
+        </p:txBody>
+      </p:sp>
+    </p:spTree>
+    <p:extLst>
+      <p:ext uri="{BB962C8B-B14F-4D97-AF65-F5344CB8AC3E}">
+        <p14:creationId xmlns:p14="http://schemas.microsoft.com/office/powerpoint/2010/main" val="2535839025"/>
+      </p:ext>
+    </p:extLst>
+  </p:cSld>
+  <p:clrMapOvr>
+    <a:masterClrMapping/>
+  </p:clrMapOvr>
+</p:sld>
+</file>
+
+<file path=ppt/slides/slide13.xml><?xml version="1.0" encoding="utf-8"?>
+<p:sld xmlns:a="http://schemas.openxmlformats.org/drawingml/2006/main" xmlns:r="http://schemas.openxmlformats.org/officeDocument/2006/relationships" xmlns:p="http://schemas.openxmlformats.org/presentationml/2006/main">
+  <p:cSld>
+    <p:spTree>
+      <p:nvGrpSpPr>
+        <p:cNvPr id="1" name=""/>
+        <p:cNvGrpSpPr/>
+        <p:nvPr/>
+      </p:nvGrpSpPr>
+      <p:grpSpPr>
+        <a:xfrm>
+          <a:off x="0" y="0"/>
+          <a:ext cx="0" cy="0"/>
+          <a:chOff x="0" y="0"/>
+          <a:chExt cx="0" cy="0"/>
+        </a:xfrm>
+      </p:grpSpPr>
+      <p:sp>
+        <p:nvSpPr>
+          <p:cNvPr id="2" name="标题 1">
+            <a:extLst>
+              <a:ext uri="{FF2B5EF4-FFF2-40B4-BE49-F238E27FC236}">
+                <a16:creationId xmlns:a16="http://schemas.microsoft.com/office/drawing/2014/main" id="{F0204979-4BD7-4E1C-9B6E-077BC76E39E7}"/>
+              </a:ext>
+            </a:extLst>
+          </p:cNvPr>
+          <p:cNvSpPr>
+            <a:spLocks noGrp="1"/>
+          </p:cNvSpPr>
+          <p:nvPr>
+            <p:ph type="title"/>
+          </p:nvPr>
+        </p:nvSpPr>
+        <p:spPr/>
+        <p:txBody>
+          <a:bodyPr/>
+          <a:lstStyle/>
+          <a:p>
+            <a:r>
+              <a:rPr lang="en-US" altLang="zh-CN" dirty="0"/>
+              <a:t>D</a:t>
+            </a:r>
+            <a:endParaRPr lang="zh-CN" altLang="en-US" dirty="0"/>
+          </a:p>
+        </p:txBody>
+      </p:sp>
+      <p:sp>
+        <p:nvSpPr>
+          <p:cNvPr id="3" name="内容占位符 2">
+            <a:extLst>
+              <a:ext uri="{FF2B5EF4-FFF2-40B4-BE49-F238E27FC236}">
+                <a16:creationId xmlns:a16="http://schemas.microsoft.com/office/drawing/2014/main" id="{9811C158-CD0B-4D65-B478-527B27F65497}"/>
+              </a:ext>
+            </a:extLst>
+          </p:cNvPr>
+          <p:cNvSpPr>
+            <a:spLocks noGrp="1"/>
+          </p:cNvSpPr>
+          <p:nvPr>
+            <p:ph idx="1"/>
+          </p:nvPr>
+        </p:nvSpPr>
+        <p:spPr/>
+        <p:txBody>
+          <a:bodyPr/>
+          <a:lstStyle/>
+          <a:p>
+            <a:pPr marL="0" indent="0">
+              <a:buNone/>
+            </a:pPr>
+            <a:endParaRPr lang="en-US" altLang="zh-CN" b="0" dirty="0"/>
+          </a:p>
+          <a:p>
+            <a:endParaRPr lang="zh-CN" altLang="en-US" dirty="0"/>
+          </a:p>
+        </p:txBody>
+      </p:sp>
+    </p:spTree>
+    <p:extLst>
+      <p:ext uri="{BB962C8B-B14F-4D97-AF65-F5344CB8AC3E}">
+        <p14:creationId xmlns:p14="http://schemas.microsoft.com/office/powerpoint/2010/main" val="811964722"/>
       </p:ext>
     </p:extLst>
   </p:cSld>

</xml_diff>